<commit_message>
last quick update to presentation
</commit_message>
<xml_diff>
--- a/Clue-Presentation.pptx
+++ b/Clue-Presentation.pptx
@@ -198,7 +198,7 @@
             <a:fld id="{0079276F-5C15-DD49-B00A-0A6B8D0882E5}" type="datetimeFigureOut">
               <a:rPr lang="en-US" smtClean="0"/>
               <a:pPr/>
-              <a:t>8/2/16</a:t>
+              <a:t>8/3/16</a:t>
             </a:fld>
             <a:endParaRPr lang="en-US"/>
           </a:p>
@@ -624,7 +624,15 @@
           <a:p>
             <a:r>
               <a:rPr lang="en-US" baseline="0" dirty="0" smtClean="0"/>
-              <a:t>During game play, players traverse the board, make suggestions in rooms, and disprove the suggestions of the other players using the cards they were dealt. Once a player has gathered enough information, she can make an accusation. If it is correct, she wins, but if it is wrong he/she loses. </a:t>
+              <a:t>During game play, players traverse the board, make suggestions in rooms, and disprove the suggestions of the other players using the cards they were dealt. Once a player has gathered enough information, she can make an accusation. If it is correct, she wins, but if it is wrong</a:t>
+            </a:r>
+            <a:r>
+              <a:rPr lang="en-US" baseline="0" dirty="0" smtClean="0"/>
+              <a:t> she </a:t>
+            </a:r>
+            <a:r>
+              <a:rPr lang="en-US" baseline="0" dirty="0" smtClean="0"/>
+              <a:t>loses. </a:t>
             </a:r>
             <a:endParaRPr lang="en-US" dirty="0"/>
           </a:p>
@@ -723,29 +731,20 @@
           <a:p>
             <a:r>
               <a:rPr lang="en-US" baseline="0" dirty="0" smtClean="0"/>
-              <a:t>The order that our players take their turns in works through </a:t>
-            </a:r>
+              <a:t>We ended up using a lot of vectors –including the players, decks of cards, and lists kept by computer players (so that computer players can try to figure out who the murderer was). Vectors are a very useful data structure for these types of constantly changing pieces of data.</a:t>
+            </a:r>
+            <a:endParaRPr lang="en-US" dirty="0" smtClean="0"/>
+          </a:p>
+          <a:p>
+            <a:endParaRPr lang="en-US" baseline="0" dirty="0" smtClean="0"/>
+          </a:p>
+          <a:p>
             <a:r>
               <a:rPr lang="en-US" baseline="0" dirty="0" smtClean="0"/>
-              <a:t>a vector that behaves in a circular fashion. </a:t>
-            </a:r>
-            <a:r>
-              <a:rPr lang="en-US" baseline="0" dirty="0" smtClean="0"/>
-              <a:t>Once the last player is reached, we loop back to the first player in the vector to allow for turns to be taken</a:t>
-            </a:r>
-            <a:r>
-              <a:rPr lang="en-US" baseline="0" dirty="0" smtClean="0"/>
-              <a:t>. This logic is also enforced when disproving a suggestion – starting with the player to the left of the player who made the suggestion and continuing through until we reach the player to their right.</a:t>
-            </a:r>
-          </a:p>
-          <a:p>
-            <a:endParaRPr lang="en-US" baseline="0" dirty="0" smtClean="0"/>
-          </a:p>
-          <a:p>
-            <a:r>
-              <a:rPr lang="en-US" baseline="0" dirty="0" smtClean="0"/>
-              <a:t>In fact, we actually ended up using a lot of vectors –in addition to the players, the decks of cards are vectors and the lists that are kept by computer players are vectors. Vectors are a very useful data structure for these types of constantly changing pieces of data.</a:t>
-            </a:r>
+              <a:t>The order of the players works through a vector that behaves in a circular fashion. This logic is enforced when disproving a suggestion – starting with the player to the left of the player who made the suggestion and continuing through until we reach the player to their right, rather than at a set beginning and end.</a:t>
+            </a:r>
+          </a:p>
+          <a:p>
             <a:endParaRPr lang="en-US" dirty="0"/>
           </a:p>
         </p:txBody>
@@ -843,7 +842,40 @@
           <a:p>
             <a:r>
               <a:rPr lang="en-US" baseline="0" dirty="0" smtClean="0"/>
-              <a:t>Finally, we found both enumerations and structures to be very useful in building our program. The enumerations were used for the different types and subtypes of cards, which was a convenient method of storing them for easy access. We used a structure to store the confidential killer cards – this was very useful because it also corresponded to the data that would be used for an accusation or suggestion, and all would have to be compared. A structure makes this easy by storing the three pieces of data types all in one place.</a:t>
+              <a:t>Finally, we found both enumerations and structures to be very useful in building our program. The enumerations were used for the different types and subtypes of cards, which was a convenient method of storing them for easy access.</a:t>
+            </a:r>
+            <a:r>
+              <a:rPr lang="en-US" baseline="0" dirty="0" smtClean="0"/>
+              <a:t> </a:t>
+            </a:r>
+          </a:p>
+          <a:p>
+            <a:endParaRPr lang="en-US" baseline="0" dirty="0" smtClean="0"/>
+          </a:p>
+          <a:p>
+            <a:r>
+              <a:rPr lang="en-US" baseline="0" dirty="0" smtClean="0"/>
+              <a:t>We </a:t>
+            </a:r>
+            <a:r>
+              <a:rPr lang="en-US" baseline="0" dirty="0" smtClean="0"/>
+              <a:t>used a structure to store the confidential killer cards – this was very useful because it also corresponded to the data that would be used for an accusation or </a:t>
+            </a:r>
+            <a:r>
+              <a:rPr lang="en-US" baseline="0" dirty="0" smtClean="0"/>
+              <a:t>suggestion, both of which need to be able to be compared to the killer cards. </a:t>
+            </a:r>
+            <a:r>
+              <a:rPr lang="en-US" baseline="0" dirty="0" smtClean="0"/>
+              <a:t>A structure makes this</a:t>
+            </a:r>
+            <a:r>
+              <a:rPr lang="en-US" baseline="0" dirty="0" smtClean="0"/>
+              <a:t> comparison easy </a:t>
+            </a:r>
+            <a:r>
+              <a:rPr lang="en-US" baseline="0" dirty="0" smtClean="0"/>
+              <a:t>by storing the three pieces of data types all in one place.</a:t>
             </a:r>
             <a:endParaRPr lang="en-US" dirty="0"/>
           </a:p>
@@ -1239,7 +1271,7 @@
             <a:fld id="{B001DBE8-BABC-4C46-A9E1-913A8B269F6D}" type="datetimeFigureOut">
               <a:rPr lang="en-US" smtClean="0"/>
               <a:pPr/>
-              <a:t>8/2/16</a:t>
+              <a:t>8/3/16</a:t>
             </a:fld>
             <a:endParaRPr lang="en-US"/>
           </a:p>
@@ -1406,7 +1438,7 @@
             <a:fld id="{B001DBE8-BABC-4C46-A9E1-913A8B269F6D}" type="datetimeFigureOut">
               <a:rPr lang="en-US" smtClean="0"/>
               <a:pPr/>
-              <a:t>8/2/16</a:t>
+              <a:t>8/3/16</a:t>
             </a:fld>
             <a:endParaRPr lang="en-US"/>
           </a:p>
@@ -1583,7 +1615,7 @@
             <a:fld id="{B001DBE8-BABC-4C46-A9E1-913A8B269F6D}" type="datetimeFigureOut">
               <a:rPr lang="en-US" smtClean="0"/>
               <a:pPr/>
-              <a:t>8/2/16</a:t>
+              <a:t>8/3/16</a:t>
             </a:fld>
             <a:endParaRPr lang="en-US"/>
           </a:p>
@@ -1750,7 +1782,7 @@
             <a:fld id="{B001DBE8-BABC-4C46-A9E1-913A8B269F6D}" type="datetimeFigureOut">
               <a:rPr lang="en-US" smtClean="0"/>
               <a:pPr/>
-              <a:t>8/2/16</a:t>
+              <a:t>8/3/16</a:t>
             </a:fld>
             <a:endParaRPr lang="en-US"/>
           </a:p>
@@ -1993,7 +2025,7 @@
             <a:fld id="{B001DBE8-BABC-4C46-A9E1-913A8B269F6D}" type="datetimeFigureOut">
               <a:rPr lang="en-US" smtClean="0"/>
               <a:pPr/>
-              <a:t>8/2/16</a:t>
+              <a:t>8/3/16</a:t>
             </a:fld>
             <a:endParaRPr lang="en-US"/>
           </a:p>
@@ -2278,7 +2310,7 @@
             <a:fld id="{B001DBE8-BABC-4C46-A9E1-913A8B269F6D}" type="datetimeFigureOut">
               <a:rPr lang="en-US" smtClean="0"/>
               <a:pPr/>
-              <a:t>8/2/16</a:t>
+              <a:t>8/3/16</a:t>
             </a:fld>
             <a:endParaRPr lang="en-US"/>
           </a:p>
@@ -2697,7 +2729,7 @@
             <a:fld id="{B001DBE8-BABC-4C46-A9E1-913A8B269F6D}" type="datetimeFigureOut">
               <a:rPr lang="en-US" smtClean="0"/>
               <a:pPr/>
-              <a:t>8/2/16</a:t>
+              <a:t>8/3/16</a:t>
             </a:fld>
             <a:endParaRPr lang="en-US"/>
           </a:p>
@@ -2812,7 +2844,7 @@
             <a:fld id="{B001DBE8-BABC-4C46-A9E1-913A8B269F6D}" type="datetimeFigureOut">
               <a:rPr lang="en-US" smtClean="0"/>
               <a:pPr/>
-              <a:t>8/2/16</a:t>
+              <a:t>8/3/16</a:t>
             </a:fld>
             <a:endParaRPr lang="en-US"/>
           </a:p>
@@ -2904,7 +2936,7 @@
             <a:fld id="{B001DBE8-BABC-4C46-A9E1-913A8B269F6D}" type="datetimeFigureOut">
               <a:rPr lang="en-US" smtClean="0"/>
               <a:pPr/>
-              <a:t>8/2/16</a:t>
+              <a:t>8/3/16</a:t>
             </a:fld>
             <a:endParaRPr lang="en-US"/>
           </a:p>
@@ -3178,7 +3210,7 @@
             <a:fld id="{B001DBE8-BABC-4C46-A9E1-913A8B269F6D}" type="datetimeFigureOut">
               <a:rPr lang="en-US" smtClean="0"/>
               <a:pPr/>
-              <a:t>8/2/16</a:t>
+              <a:t>8/3/16</a:t>
             </a:fld>
             <a:endParaRPr lang="en-US"/>
           </a:p>
@@ -3432,7 +3464,7 @@
             <a:fld id="{B001DBE8-BABC-4C46-A9E1-913A8B269F6D}" type="datetimeFigureOut">
               <a:rPr lang="en-US" smtClean="0"/>
               <a:pPr/>
-              <a:t>8/2/16</a:t>
+              <a:t>8/3/16</a:t>
             </a:fld>
             <a:endParaRPr lang="en-US"/>
           </a:p>
@@ -3652,7 +3684,7 @@
             <a:fld id="{B001DBE8-BABC-4C46-A9E1-913A8B269F6D}" type="datetimeFigureOut">
               <a:rPr lang="en-US" smtClean="0"/>
               <a:pPr/>
-              <a:t>8/2/16</a:t>
+              <a:t>8/3/16</a:t>
             </a:fld>
             <a:endParaRPr lang="en-US"/>
           </a:p>
@@ -4490,26 +4522,32 @@
               <a:rPr lang="en-US" sz="2600" dirty="0" smtClean="0"/>
               <a:t>The board is a graph (the rooms are the nodes and their connected rooms are the edges)</a:t>
             </a:r>
+            <a:endParaRPr lang="en-US" sz="2600" dirty="0" smtClean="0"/>
           </a:p>
           <a:p>
             <a:r>
               <a:rPr lang="en-US" sz="2600" dirty="0" smtClean="0"/>
-              <a:t>The order of players is a </a:t>
+              <a:t>Lots </a:t>
             </a:r>
             <a:r>
               <a:rPr lang="en-US" sz="2600" dirty="0" smtClean="0"/>
-              <a:t>circular like </a:t>
+              <a:t>of vectors are used (cards, players, lists</a:t>
+            </a:r>
+            <a:r>
+              <a:rPr lang="en-US" sz="2600" dirty="0" smtClean="0"/>
+              <a:t>)</a:t>
+            </a:r>
+          </a:p>
+          <a:p>
+            <a:r>
+              <a:rPr lang="en-US" sz="2600" dirty="0" smtClean="0"/>
+              <a:t>The order of players is a circular like </a:t>
             </a:r>
             <a:r>
               <a:rPr lang="en-US" sz="2600" dirty="0" smtClean="0"/>
               <a:t>vector</a:t>
             </a:r>
-          </a:p>
-          <a:p>
-            <a:r>
-              <a:rPr lang="en-US" sz="2600" dirty="0" smtClean="0"/>
-              <a:t>Lots of vectors are used (cards, players, lists)</a:t>
-            </a:r>
+            <a:endParaRPr lang="en-US" sz="2600" dirty="0" smtClean="0"/>
           </a:p>
         </p:txBody>
       </p:sp>

</xml_diff>